<commit_message>
Modify logos and fix download bug for unclustered row labels due to downloadHandler reactivity issue
</commit_message>
<xml_diff>
--- a/images/logos.pptx
+++ b/images/logos.pptx
@@ -244,7 +244,7 @@
           <a:p>
             <a:fld id="{5B6B21D4-47AF-4596-9875-DCA8B4701C47}" type="datetimeFigureOut">
               <a:rPr lang="en-US" smtClean="0"/>
-              <a:t>11/26/18</a:t>
+              <a:t>6/4/19</a:t>
             </a:fld>
             <a:endParaRPr lang="en-US"/>
           </a:p>
@@ -414,7 +414,7 @@
           <a:p>
             <a:fld id="{5B6B21D4-47AF-4596-9875-DCA8B4701C47}" type="datetimeFigureOut">
               <a:rPr lang="en-US" smtClean="0"/>
-              <a:t>11/26/18</a:t>
+              <a:t>6/4/19</a:t>
             </a:fld>
             <a:endParaRPr lang="en-US"/>
           </a:p>
@@ -594,7 +594,7 @@
           <a:p>
             <a:fld id="{5B6B21D4-47AF-4596-9875-DCA8B4701C47}" type="datetimeFigureOut">
               <a:rPr lang="en-US" smtClean="0"/>
-              <a:t>11/26/18</a:t>
+              <a:t>6/4/19</a:t>
             </a:fld>
             <a:endParaRPr lang="en-US"/>
           </a:p>
@@ -764,7 +764,7 @@
           <a:p>
             <a:fld id="{5B6B21D4-47AF-4596-9875-DCA8B4701C47}" type="datetimeFigureOut">
               <a:rPr lang="en-US" smtClean="0"/>
-              <a:t>11/26/18</a:t>
+              <a:t>6/4/19</a:t>
             </a:fld>
             <a:endParaRPr lang="en-US"/>
           </a:p>
@@ -1010,7 +1010,7 @@
           <a:p>
             <a:fld id="{5B6B21D4-47AF-4596-9875-DCA8B4701C47}" type="datetimeFigureOut">
               <a:rPr lang="en-US" smtClean="0"/>
-              <a:t>11/26/18</a:t>
+              <a:t>6/4/19</a:t>
             </a:fld>
             <a:endParaRPr lang="en-US"/>
           </a:p>
@@ -1242,7 +1242,7 @@
           <a:p>
             <a:fld id="{5B6B21D4-47AF-4596-9875-DCA8B4701C47}" type="datetimeFigureOut">
               <a:rPr lang="en-US" smtClean="0"/>
-              <a:t>11/26/18</a:t>
+              <a:t>6/4/19</a:t>
             </a:fld>
             <a:endParaRPr lang="en-US"/>
           </a:p>
@@ -1609,7 +1609,7 @@
           <a:p>
             <a:fld id="{5B6B21D4-47AF-4596-9875-DCA8B4701C47}" type="datetimeFigureOut">
               <a:rPr lang="en-US" smtClean="0"/>
-              <a:t>11/26/18</a:t>
+              <a:t>6/4/19</a:t>
             </a:fld>
             <a:endParaRPr lang="en-US"/>
           </a:p>
@@ -1727,7 +1727,7 @@
           <a:p>
             <a:fld id="{5B6B21D4-47AF-4596-9875-DCA8B4701C47}" type="datetimeFigureOut">
               <a:rPr lang="en-US" smtClean="0"/>
-              <a:t>11/26/18</a:t>
+              <a:t>6/4/19</a:t>
             </a:fld>
             <a:endParaRPr lang="en-US"/>
           </a:p>
@@ -1822,7 +1822,7 @@
           <a:p>
             <a:fld id="{5B6B21D4-47AF-4596-9875-DCA8B4701C47}" type="datetimeFigureOut">
               <a:rPr lang="en-US" smtClean="0"/>
-              <a:t>11/26/18</a:t>
+              <a:t>6/4/19</a:t>
             </a:fld>
             <a:endParaRPr lang="en-US"/>
           </a:p>
@@ -2099,7 +2099,7 @@
           <a:p>
             <a:fld id="{5B6B21D4-47AF-4596-9875-DCA8B4701C47}" type="datetimeFigureOut">
               <a:rPr lang="en-US" smtClean="0"/>
-              <a:t>11/26/18</a:t>
+              <a:t>6/4/19</a:t>
             </a:fld>
             <a:endParaRPr lang="en-US"/>
           </a:p>
@@ -2352,7 +2352,7 @@
           <a:p>
             <a:fld id="{5B6B21D4-47AF-4596-9875-DCA8B4701C47}" type="datetimeFigureOut">
               <a:rPr lang="en-US" smtClean="0"/>
-              <a:t>11/26/18</a:t>
+              <a:t>6/4/19</a:t>
             </a:fld>
             <a:endParaRPr lang="en-US"/>
           </a:p>
@@ -2565,7 +2565,7 @@
           <a:p>
             <a:fld id="{5B6B21D4-47AF-4596-9875-DCA8B4701C47}" type="datetimeFigureOut">
               <a:rPr lang="en-US" smtClean="0"/>
-              <a:t>11/26/18</a:t>
+              <a:t>6/4/19</a:t>
             </a:fld>
             <a:endParaRPr lang="en-US"/>
           </a:p>
@@ -3060,36 +3060,6 @@
           </a:prstGeom>
         </p:spPr>
       </p:pic>
-      <p:pic>
-        <p:nvPicPr>
-          <p:cNvPr id="3" name="Picture 2">
-            <a:extLst>
-              <a:ext uri="{FF2B5EF4-FFF2-40B4-BE49-F238E27FC236}">
-                <a16:creationId xmlns:a16="http://schemas.microsoft.com/office/drawing/2014/main" id="{D9091149-0EA6-874A-8E93-C250F6CF15A9}"/>
-              </a:ext>
-            </a:extLst>
-          </p:cNvPr>
-          <p:cNvPicPr>
-            <a:picLocks noChangeAspect="1"/>
-          </p:cNvPicPr>
-          <p:nvPr/>
-        </p:nvPicPr>
-        <p:blipFill>
-          <a:blip r:embed="rId5"/>
-          <a:stretch>
-            <a:fillRect/>
-          </a:stretch>
-        </p:blipFill>
-        <p:spPr>
-          <a:xfrm>
-            <a:off x="6288857" y="114269"/>
-            <a:ext cx="1270000" cy="1028700"/>
-          </a:xfrm>
-          <a:prstGeom prst="rect">
-            <a:avLst/>
-          </a:prstGeom>
-        </p:spPr>
-      </p:pic>
     </p:spTree>
     <p:extLst>
       <p:ext uri="{BB962C8B-B14F-4D97-AF65-F5344CB8AC3E}">

</xml_diff>